<commit_message>
The report is finally done!
- Added section ondataflow diagram
- Added more nfo in experiment
- Updated and inserted figures
- Cost comparisons
- Formatting
- PAGE NUMBERS!!
</commit_message>
<xml_diff>
--- a/Reports/Graphics/Sensor Diagrams.pptx
+++ b/Reports/Graphics/Sensor Diagrams.pptx
@@ -6,6 +6,7 @@
   </p:sldMasterIdLst>
   <p:sldIdLst>
     <p:sldId id="256" r:id="rId2"/>
+    <p:sldId id="257" r:id="rId3"/>
   </p:sldIdLst>
   <p:sldSz cx="9144000" cy="6858000" type="screen4x3"/>
   <p:notesSz cx="6858000" cy="9144000"/>
@@ -289,7 +290,7 @@
             <a:fld id="{1D8BD707-D9CF-40AE-B4C6-C98DA3205C09}" type="datetimeFigureOut">
               <a:rPr lang="en-US" smtClean="0"/>
               <a:pPr/>
-              <a:t>5/21/2015</a:t>
+              <a:t>5/22/2015</a:t>
             </a:fld>
             <a:endParaRPr lang="en-US"/>
           </a:p>
@@ -456,7 +457,7 @@
             <a:fld id="{1D8BD707-D9CF-40AE-B4C6-C98DA3205C09}" type="datetimeFigureOut">
               <a:rPr lang="en-US" smtClean="0"/>
               <a:pPr/>
-              <a:t>5/21/2015</a:t>
+              <a:t>5/22/2015</a:t>
             </a:fld>
             <a:endParaRPr lang="en-US"/>
           </a:p>
@@ -633,7 +634,7 @@
             <a:fld id="{1D8BD707-D9CF-40AE-B4C6-C98DA3205C09}" type="datetimeFigureOut">
               <a:rPr lang="en-US" smtClean="0"/>
               <a:pPr/>
-              <a:t>5/21/2015</a:t>
+              <a:t>5/22/2015</a:t>
             </a:fld>
             <a:endParaRPr lang="en-US"/>
           </a:p>
@@ -800,7 +801,7 @@
             <a:fld id="{1D8BD707-D9CF-40AE-B4C6-C98DA3205C09}" type="datetimeFigureOut">
               <a:rPr lang="en-US" smtClean="0"/>
               <a:pPr/>
-              <a:t>5/21/2015</a:t>
+              <a:t>5/22/2015</a:t>
             </a:fld>
             <a:endParaRPr lang="en-US"/>
           </a:p>
@@ -1043,7 +1044,7 @@
             <a:fld id="{1D8BD707-D9CF-40AE-B4C6-C98DA3205C09}" type="datetimeFigureOut">
               <a:rPr lang="en-US" smtClean="0"/>
               <a:pPr/>
-              <a:t>5/21/2015</a:t>
+              <a:t>5/22/2015</a:t>
             </a:fld>
             <a:endParaRPr lang="en-US"/>
           </a:p>
@@ -1328,7 +1329,7 @@
             <a:fld id="{1D8BD707-D9CF-40AE-B4C6-C98DA3205C09}" type="datetimeFigureOut">
               <a:rPr lang="en-US" smtClean="0"/>
               <a:pPr/>
-              <a:t>5/21/2015</a:t>
+              <a:t>5/22/2015</a:t>
             </a:fld>
             <a:endParaRPr lang="en-US"/>
           </a:p>
@@ -1747,7 +1748,7 @@
             <a:fld id="{1D8BD707-D9CF-40AE-B4C6-C98DA3205C09}" type="datetimeFigureOut">
               <a:rPr lang="en-US" smtClean="0"/>
               <a:pPr/>
-              <a:t>5/21/2015</a:t>
+              <a:t>5/22/2015</a:t>
             </a:fld>
             <a:endParaRPr lang="en-US"/>
           </a:p>
@@ -1862,7 +1863,7 @@
             <a:fld id="{1D8BD707-D9CF-40AE-B4C6-C98DA3205C09}" type="datetimeFigureOut">
               <a:rPr lang="en-US" smtClean="0"/>
               <a:pPr/>
-              <a:t>5/21/2015</a:t>
+              <a:t>5/22/2015</a:t>
             </a:fld>
             <a:endParaRPr lang="en-US"/>
           </a:p>
@@ -1954,7 +1955,7 @@
             <a:fld id="{1D8BD707-D9CF-40AE-B4C6-C98DA3205C09}" type="datetimeFigureOut">
               <a:rPr lang="en-US" smtClean="0"/>
               <a:pPr/>
-              <a:t>5/21/2015</a:t>
+              <a:t>5/22/2015</a:t>
             </a:fld>
             <a:endParaRPr lang="en-US"/>
           </a:p>
@@ -2228,7 +2229,7 @@
             <a:fld id="{1D8BD707-D9CF-40AE-B4C6-C98DA3205C09}" type="datetimeFigureOut">
               <a:rPr lang="en-US" smtClean="0"/>
               <a:pPr/>
-              <a:t>5/21/2015</a:t>
+              <a:t>5/22/2015</a:t>
             </a:fld>
             <a:endParaRPr lang="en-US"/>
           </a:p>
@@ -2478,7 +2479,7 @@
             <a:fld id="{1D8BD707-D9CF-40AE-B4C6-C98DA3205C09}" type="datetimeFigureOut">
               <a:rPr lang="en-US" smtClean="0"/>
               <a:pPr/>
-              <a:t>5/21/2015</a:t>
+              <a:t>5/22/2015</a:t>
             </a:fld>
             <a:endParaRPr lang="en-US"/>
           </a:p>
@@ -2688,7 +2689,7 @@
             <a:fld id="{1D8BD707-D9CF-40AE-B4C6-C98DA3205C09}" type="datetimeFigureOut">
               <a:rPr lang="en-US" smtClean="0"/>
               <a:pPr/>
-              <a:t>5/21/2015</a:t>
+              <a:t>5/22/2015</a:t>
             </a:fld>
             <a:endParaRPr lang="en-US"/>
           </a:p>
@@ -3721,6 +3722,1290 @@
 </p:sld>
 </file>
 
+<file path=ppt/slides/slide2.xml><?xml version="1.0" encoding="utf-8"?>
+<p:sld xmlns:a="http://schemas.openxmlformats.org/drawingml/2006/main" xmlns:r="http://schemas.openxmlformats.org/officeDocument/2006/relationships" xmlns:p="http://schemas.openxmlformats.org/presentationml/2006/main">
+  <p:cSld>
+    <p:spTree>
+      <p:nvGrpSpPr>
+        <p:cNvPr id="1" name=""/>
+        <p:cNvGrpSpPr/>
+        <p:nvPr/>
+      </p:nvGrpSpPr>
+      <p:grpSpPr>
+        <a:xfrm>
+          <a:off x="0" y="0"/>
+          <a:ext cx="0" cy="0"/>
+          <a:chOff x="0" y="0"/>
+          <a:chExt cx="0" cy="0"/>
+        </a:xfrm>
+      </p:grpSpPr>
+      <p:grpSp>
+        <p:nvGrpSpPr>
+          <p:cNvPr id="3" name="Group 2"/>
+          <p:cNvGrpSpPr/>
+          <p:nvPr/>
+        </p:nvGrpSpPr>
+        <p:grpSpPr>
+          <a:xfrm>
+            <a:off x="1139428" y="2550318"/>
+            <a:ext cx="6823472" cy="2326482"/>
+            <a:chOff x="1139428" y="2550318"/>
+            <a:chExt cx="6823472" cy="2326482"/>
+          </a:xfrm>
+        </p:grpSpPr>
+        <p:sp>
+          <p:nvSpPr>
+            <p:cNvPr id="10" name="Oval 9"/>
+            <p:cNvSpPr/>
+            <p:nvPr/>
+          </p:nvSpPr>
+          <p:spPr>
+            <a:xfrm>
+              <a:off x="3762376" y="2743200"/>
+              <a:ext cx="1447800" cy="1447800"/>
+            </a:xfrm>
+            <a:prstGeom prst="ellipse">
+              <a:avLst/>
+            </a:prstGeom>
+            <a:solidFill>
+              <a:schemeClr val="bg1">
+                <a:lumMod val="95000"/>
+              </a:schemeClr>
+            </a:solidFill>
+            <a:ln>
+              <a:solidFill>
+                <a:schemeClr val="tx1"/>
+              </a:solidFill>
+            </a:ln>
+          </p:spPr>
+          <p:style>
+            <a:lnRef idx="2">
+              <a:schemeClr val="accent1">
+                <a:shade val="50000"/>
+              </a:schemeClr>
+            </a:lnRef>
+            <a:fillRef idx="1">
+              <a:schemeClr val="accent1"/>
+            </a:fillRef>
+            <a:effectRef idx="0">
+              <a:schemeClr val="accent1"/>
+            </a:effectRef>
+            <a:fontRef idx="minor">
+              <a:schemeClr val="lt1"/>
+            </a:fontRef>
+          </p:style>
+          <p:txBody>
+            <a:bodyPr rtlCol="0" anchor="ctr"/>
+            <a:lstStyle/>
+            <a:p>
+              <a:pPr algn="ctr"/>
+              <a:endParaRPr lang="en-NZ"/>
+            </a:p>
+          </p:txBody>
+        </p:sp>
+        <p:sp>
+          <p:nvSpPr>
+            <p:cNvPr id="11" name="Freeform 10"/>
+            <p:cNvSpPr/>
+            <p:nvPr/>
+          </p:nvSpPr>
+          <p:spPr>
+            <a:xfrm>
+              <a:off x="4129089" y="2550319"/>
+              <a:ext cx="714375" cy="269081"/>
+            </a:xfrm>
+            <a:custGeom>
+              <a:avLst/>
+              <a:gdLst>
+                <a:gd name="connsiteX0" fmla="*/ 0 w 603250"/>
+                <a:gd name="connsiteY0" fmla="*/ 0 h 266700"/>
+                <a:gd name="connsiteX1" fmla="*/ 0 w 603250"/>
+                <a:gd name="connsiteY1" fmla="*/ 266700 h 266700"/>
+                <a:gd name="connsiteX2" fmla="*/ 79375 w 603250"/>
+                <a:gd name="connsiteY2" fmla="*/ 187325 h 266700"/>
+                <a:gd name="connsiteX3" fmla="*/ 542925 w 603250"/>
+                <a:gd name="connsiteY3" fmla="*/ 187325 h 266700"/>
+                <a:gd name="connsiteX4" fmla="*/ 603250 w 603250"/>
+                <a:gd name="connsiteY4" fmla="*/ 247650 h 266700"/>
+                <a:gd name="connsiteX5" fmla="*/ 603250 w 603250"/>
+                <a:gd name="connsiteY5" fmla="*/ 0 h 266700"/>
+                <a:gd name="connsiteX6" fmla="*/ 0 w 603250"/>
+                <a:gd name="connsiteY6" fmla="*/ 0 h 266700"/>
+                <a:gd name="connsiteX0" fmla="*/ 55562 w 658812"/>
+                <a:gd name="connsiteY0" fmla="*/ 0 h 269081"/>
+                <a:gd name="connsiteX1" fmla="*/ 0 w 658812"/>
+                <a:gd name="connsiteY1" fmla="*/ 269081 h 269081"/>
+                <a:gd name="connsiteX2" fmla="*/ 55562 w 658812"/>
+                <a:gd name="connsiteY2" fmla="*/ 266700 h 269081"/>
+                <a:gd name="connsiteX3" fmla="*/ 134937 w 658812"/>
+                <a:gd name="connsiteY3" fmla="*/ 187325 h 269081"/>
+                <a:gd name="connsiteX4" fmla="*/ 598487 w 658812"/>
+                <a:gd name="connsiteY4" fmla="*/ 187325 h 269081"/>
+                <a:gd name="connsiteX5" fmla="*/ 658812 w 658812"/>
+                <a:gd name="connsiteY5" fmla="*/ 247650 h 269081"/>
+                <a:gd name="connsiteX6" fmla="*/ 658812 w 658812"/>
+                <a:gd name="connsiteY6" fmla="*/ 0 h 269081"/>
+                <a:gd name="connsiteX7" fmla="*/ 55562 w 658812"/>
+                <a:gd name="connsiteY7" fmla="*/ 0 h 269081"/>
+                <a:gd name="connsiteX0" fmla="*/ 3175 w 658812"/>
+                <a:gd name="connsiteY0" fmla="*/ 0 h 269081"/>
+                <a:gd name="connsiteX1" fmla="*/ 0 w 658812"/>
+                <a:gd name="connsiteY1" fmla="*/ 269081 h 269081"/>
+                <a:gd name="connsiteX2" fmla="*/ 55562 w 658812"/>
+                <a:gd name="connsiteY2" fmla="*/ 266700 h 269081"/>
+                <a:gd name="connsiteX3" fmla="*/ 134937 w 658812"/>
+                <a:gd name="connsiteY3" fmla="*/ 187325 h 269081"/>
+                <a:gd name="connsiteX4" fmla="*/ 598487 w 658812"/>
+                <a:gd name="connsiteY4" fmla="*/ 187325 h 269081"/>
+                <a:gd name="connsiteX5" fmla="*/ 658812 w 658812"/>
+                <a:gd name="connsiteY5" fmla="*/ 247650 h 269081"/>
+                <a:gd name="connsiteX6" fmla="*/ 658812 w 658812"/>
+                <a:gd name="connsiteY6" fmla="*/ 0 h 269081"/>
+                <a:gd name="connsiteX7" fmla="*/ 3175 w 658812"/>
+                <a:gd name="connsiteY7" fmla="*/ 0 h 269081"/>
+                <a:gd name="connsiteX0" fmla="*/ 3175 w 713581"/>
+                <a:gd name="connsiteY0" fmla="*/ 0 h 269081"/>
+                <a:gd name="connsiteX1" fmla="*/ 0 w 713581"/>
+                <a:gd name="connsiteY1" fmla="*/ 269081 h 269081"/>
+                <a:gd name="connsiteX2" fmla="*/ 55562 w 713581"/>
+                <a:gd name="connsiteY2" fmla="*/ 266700 h 269081"/>
+                <a:gd name="connsiteX3" fmla="*/ 134937 w 713581"/>
+                <a:gd name="connsiteY3" fmla="*/ 187325 h 269081"/>
+                <a:gd name="connsiteX4" fmla="*/ 598487 w 713581"/>
+                <a:gd name="connsiteY4" fmla="*/ 187325 h 269081"/>
+                <a:gd name="connsiteX5" fmla="*/ 658812 w 713581"/>
+                <a:gd name="connsiteY5" fmla="*/ 247650 h 269081"/>
+                <a:gd name="connsiteX6" fmla="*/ 713581 w 713581"/>
+                <a:gd name="connsiteY6" fmla="*/ 0 h 269081"/>
+                <a:gd name="connsiteX7" fmla="*/ 3175 w 713581"/>
+                <a:gd name="connsiteY7" fmla="*/ 0 h 269081"/>
+                <a:gd name="connsiteX0" fmla="*/ 3175 w 716756"/>
+                <a:gd name="connsiteY0" fmla="*/ 0 h 269081"/>
+                <a:gd name="connsiteX1" fmla="*/ 0 w 716756"/>
+                <a:gd name="connsiteY1" fmla="*/ 269081 h 269081"/>
+                <a:gd name="connsiteX2" fmla="*/ 55562 w 716756"/>
+                <a:gd name="connsiteY2" fmla="*/ 266700 h 269081"/>
+                <a:gd name="connsiteX3" fmla="*/ 134937 w 716756"/>
+                <a:gd name="connsiteY3" fmla="*/ 187325 h 269081"/>
+                <a:gd name="connsiteX4" fmla="*/ 598487 w 716756"/>
+                <a:gd name="connsiteY4" fmla="*/ 187325 h 269081"/>
+                <a:gd name="connsiteX5" fmla="*/ 658812 w 716756"/>
+                <a:gd name="connsiteY5" fmla="*/ 247650 h 269081"/>
+                <a:gd name="connsiteX6" fmla="*/ 716756 w 716756"/>
+                <a:gd name="connsiteY6" fmla="*/ 238125 h 269081"/>
+                <a:gd name="connsiteX7" fmla="*/ 713581 w 716756"/>
+                <a:gd name="connsiteY7" fmla="*/ 0 h 269081"/>
+                <a:gd name="connsiteX8" fmla="*/ 3175 w 716756"/>
+                <a:gd name="connsiteY8" fmla="*/ 0 h 269081"/>
+                <a:gd name="connsiteX0" fmla="*/ 3175 w 852487"/>
+                <a:gd name="connsiteY0" fmla="*/ 0 h 269081"/>
+                <a:gd name="connsiteX1" fmla="*/ 0 w 852487"/>
+                <a:gd name="connsiteY1" fmla="*/ 269081 h 269081"/>
+                <a:gd name="connsiteX2" fmla="*/ 55562 w 852487"/>
+                <a:gd name="connsiteY2" fmla="*/ 266700 h 269081"/>
+                <a:gd name="connsiteX3" fmla="*/ 134937 w 852487"/>
+                <a:gd name="connsiteY3" fmla="*/ 187325 h 269081"/>
+                <a:gd name="connsiteX4" fmla="*/ 598487 w 852487"/>
+                <a:gd name="connsiteY4" fmla="*/ 187325 h 269081"/>
+                <a:gd name="connsiteX5" fmla="*/ 658812 w 852487"/>
+                <a:gd name="connsiteY5" fmla="*/ 247650 h 269081"/>
+                <a:gd name="connsiteX6" fmla="*/ 852487 w 852487"/>
+                <a:gd name="connsiteY6" fmla="*/ 119063 h 269081"/>
+                <a:gd name="connsiteX7" fmla="*/ 713581 w 852487"/>
+                <a:gd name="connsiteY7" fmla="*/ 0 h 269081"/>
+                <a:gd name="connsiteX8" fmla="*/ 3175 w 852487"/>
+                <a:gd name="connsiteY8" fmla="*/ 0 h 269081"/>
+                <a:gd name="connsiteX0" fmla="*/ 3175 w 714375"/>
+                <a:gd name="connsiteY0" fmla="*/ 0 h 269081"/>
+                <a:gd name="connsiteX1" fmla="*/ 0 w 714375"/>
+                <a:gd name="connsiteY1" fmla="*/ 269081 h 269081"/>
+                <a:gd name="connsiteX2" fmla="*/ 55562 w 714375"/>
+                <a:gd name="connsiteY2" fmla="*/ 266700 h 269081"/>
+                <a:gd name="connsiteX3" fmla="*/ 134937 w 714375"/>
+                <a:gd name="connsiteY3" fmla="*/ 187325 h 269081"/>
+                <a:gd name="connsiteX4" fmla="*/ 598487 w 714375"/>
+                <a:gd name="connsiteY4" fmla="*/ 187325 h 269081"/>
+                <a:gd name="connsiteX5" fmla="*/ 658812 w 714375"/>
+                <a:gd name="connsiteY5" fmla="*/ 247650 h 269081"/>
+                <a:gd name="connsiteX6" fmla="*/ 714375 w 714375"/>
+                <a:gd name="connsiteY6" fmla="*/ 240507 h 269081"/>
+                <a:gd name="connsiteX7" fmla="*/ 713581 w 714375"/>
+                <a:gd name="connsiteY7" fmla="*/ 0 h 269081"/>
+                <a:gd name="connsiteX8" fmla="*/ 3175 w 714375"/>
+                <a:gd name="connsiteY8" fmla="*/ 0 h 269081"/>
+              </a:gdLst>
+              <a:ahLst/>
+              <a:cxnLst>
+                <a:cxn ang="0">
+                  <a:pos x="connsiteX0" y="connsiteY0"/>
+                </a:cxn>
+                <a:cxn ang="0">
+                  <a:pos x="connsiteX1" y="connsiteY1"/>
+                </a:cxn>
+                <a:cxn ang="0">
+                  <a:pos x="connsiteX2" y="connsiteY2"/>
+                </a:cxn>
+                <a:cxn ang="0">
+                  <a:pos x="connsiteX3" y="connsiteY3"/>
+                </a:cxn>
+                <a:cxn ang="0">
+                  <a:pos x="connsiteX4" y="connsiteY4"/>
+                </a:cxn>
+                <a:cxn ang="0">
+                  <a:pos x="connsiteX5" y="connsiteY5"/>
+                </a:cxn>
+                <a:cxn ang="0">
+                  <a:pos x="connsiteX6" y="connsiteY6"/>
+                </a:cxn>
+                <a:cxn ang="0">
+                  <a:pos x="connsiteX7" y="connsiteY7"/>
+                </a:cxn>
+                <a:cxn ang="0">
+                  <a:pos x="connsiteX8" y="connsiteY8"/>
+                </a:cxn>
+              </a:cxnLst>
+              <a:rect l="l" t="t" r="r" b="b"/>
+              <a:pathLst>
+                <a:path w="714375" h="269081">
+                  <a:moveTo>
+                    <a:pt x="3175" y="0"/>
+                  </a:moveTo>
+                  <a:cubicBezTo>
+                    <a:pt x="2117" y="57150"/>
+                    <a:pt x="1058" y="211931"/>
+                    <a:pt x="0" y="269081"/>
+                  </a:cubicBezTo>
+                  <a:lnTo>
+                    <a:pt x="55562" y="266700"/>
+                  </a:lnTo>
+                  <a:lnTo>
+                    <a:pt x="134937" y="187325"/>
+                  </a:lnTo>
+                  <a:lnTo>
+                    <a:pt x="598487" y="187325"/>
+                  </a:lnTo>
+                  <a:lnTo>
+                    <a:pt x="658812" y="247650"/>
+                  </a:lnTo>
+                  <a:cubicBezTo>
+                    <a:pt x="660664" y="237331"/>
+                    <a:pt x="712523" y="250826"/>
+                    <a:pt x="714375" y="240507"/>
+                  </a:cubicBezTo>
+                  <a:cubicBezTo>
+                    <a:pt x="713317" y="161132"/>
+                    <a:pt x="714639" y="79375"/>
+                    <a:pt x="713581" y="0"/>
+                  </a:cubicBezTo>
+                  <a:lnTo>
+                    <a:pt x="3175" y="0"/>
+                  </a:lnTo>
+                  <a:close/>
+                </a:path>
+              </a:pathLst>
+            </a:custGeom>
+            <a:solidFill>
+              <a:schemeClr val="bg1">
+                <a:lumMod val="95000"/>
+              </a:schemeClr>
+            </a:solidFill>
+            <a:ln>
+              <a:solidFill>
+                <a:schemeClr val="tx1"/>
+              </a:solidFill>
+            </a:ln>
+          </p:spPr>
+          <p:style>
+            <a:lnRef idx="2">
+              <a:schemeClr val="accent1">
+                <a:shade val="50000"/>
+              </a:schemeClr>
+            </a:lnRef>
+            <a:fillRef idx="1">
+              <a:schemeClr val="accent1"/>
+            </a:fillRef>
+            <a:effectRef idx="0">
+              <a:schemeClr val="accent1"/>
+            </a:effectRef>
+            <a:fontRef idx="minor">
+              <a:schemeClr val="lt1"/>
+            </a:fontRef>
+          </p:style>
+          <p:txBody>
+            <a:bodyPr rtlCol="0" anchor="ctr"/>
+            <a:lstStyle/>
+            <a:p>
+              <a:pPr algn="ctr"/>
+              <a:endParaRPr lang="en-NZ"/>
+            </a:p>
+          </p:txBody>
+        </p:sp>
+        <p:sp>
+          <p:nvSpPr>
+            <p:cNvPr id="13" name="Freeform 12"/>
+            <p:cNvSpPr/>
+            <p:nvPr/>
+          </p:nvSpPr>
+          <p:spPr>
+            <a:xfrm>
+              <a:off x="1504949" y="2550319"/>
+              <a:ext cx="714375" cy="269081"/>
+            </a:xfrm>
+            <a:custGeom>
+              <a:avLst/>
+              <a:gdLst>
+                <a:gd name="connsiteX0" fmla="*/ 0 w 603250"/>
+                <a:gd name="connsiteY0" fmla="*/ 0 h 266700"/>
+                <a:gd name="connsiteX1" fmla="*/ 0 w 603250"/>
+                <a:gd name="connsiteY1" fmla="*/ 266700 h 266700"/>
+                <a:gd name="connsiteX2" fmla="*/ 79375 w 603250"/>
+                <a:gd name="connsiteY2" fmla="*/ 187325 h 266700"/>
+                <a:gd name="connsiteX3" fmla="*/ 542925 w 603250"/>
+                <a:gd name="connsiteY3" fmla="*/ 187325 h 266700"/>
+                <a:gd name="connsiteX4" fmla="*/ 603250 w 603250"/>
+                <a:gd name="connsiteY4" fmla="*/ 247650 h 266700"/>
+                <a:gd name="connsiteX5" fmla="*/ 603250 w 603250"/>
+                <a:gd name="connsiteY5" fmla="*/ 0 h 266700"/>
+                <a:gd name="connsiteX6" fmla="*/ 0 w 603250"/>
+                <a:gd name="connsiteY6" fmla="*/ 0 h 266700"/>
+                <a:gd name="connsiteX0" fmla="*/ 55562 w 658812"/>
+                <a:gd name="connsiteY0" fmla="*/ 0 h 269081"/>
+                <a:gd name="connsiteX1" fmla="*/ 0 w 658812"/>
+                <a:gd name="connsiteY1" fmla="*/ 269081 h 269081"/>
+                <a:gd name="connsiteX2" fmla="*/ 55562 w 658812"/>
+                <a:gd name="connsiteY2" fmla="*/ 266700 h 269081"/>
+                <a:gd name="connsiteX3" fmla="*/ 134937 w 658812"/>
+                <a:gd name="connsiteY3" fmla="*/ 187325 h 269081"/>
+                <a:gd name="connsiteX4" fmla="*/ 598487 w 658812"/>
+                <a:gd name="connsiteY4" fmla="*/ 187325 h 269081"/>
+                <a:gd name="connsiteX5" fmla="*/ 658812 w 658812"/>
+                <a:gd name="connsiteY5" fmla="*/ 247650 h 269081"/>
+                <a:gd name="connsiteX6" fmla="*/ 658812 w 658812"/>
+                <a:gd name="connsiteY6" fmla="*/ 0 h 269081"/>
+                <a:gd name="connsiteX7" fmla="*/ 55562 w 658812"/>
+                <a:gd name="connsiteY7" fmla="*/ 0 h 269081"/>
+                <a:gd name="connsiteX0" fmla="*/ 3175 w 658812"/>
+                <a:gd name="connsiteY0" fmla="*/ 0 h 269081"/>
+                <a:gd name="connsiteX1" fmla="*/ 0 w 658812"/>
+                <a:gd name="connsiteY1" fmla="*/ 269081 h 269081"/>
+                <a:gd name="connsiteX2" fmla="*/ 55562 w 658812"/>
+                <a:gd name="connsiteY2" fmla="*/ 266700 h 269081"/>
+                <a:gd name="connsiteX3" fmla="*/ 134937 w 658812"/>
+                <a:gd name="connsiteY3" fmla="*/ 187325 h 269081"/>
+                <a:gd name="connsiteX4" fmla="*/ 598487 w 658812"/>
+                <a:gd name="connsiteY4" fmla="*/ 187325 h 269081"/>
+                <a:gd name="connsiteX5" fmla="*/ 658812 w 658812"/>
+                <a:gd name="connsiteY5" fmla="*/ 247650 h 269081"/>
+                <a:gd name="connsiteX6" fmla="*/ 658812 w 658812"/>
+                <a:gd name="connsiteY6" fmla="*/ 0 h 269081"/>
+                <a:gd name="connsiteX7" fmla="*/ 3175 w 658812"/>
+                <a:gd name="connsiteY7" fmla="*/ 0 h 269081"/>
+                <a:gd name="connsiteX0" fmla="*/ 3175 w 713581"/>
+                <a:gd name="connsiteY0" fmla="*/ 0 h 269081"/>
+                <a:gd name="connsiteX1" fmla="*/ 0 w 713581"/>
+                <a:gd name="connsiteY1" fmla="*/ 269081 h 269081"/>
+                <a:gd name="connsiteX2" fmla="*/ 55562 w 713581"/>
+                <a:gd name="connsiteY2" fmla="*/ 266700 h 269081"/>
+                <a:gd name="connsiteX3" fmla="*/ 134937 w 713581"/>
+                <a:gd name="connsiteY3" fmla="*/ 187325 h 269081"/>
+                <a:gd name="connsiteX4" fmla="*/ 598487 w 713581"/>
+                <a:gd name="connsiteY4" fmla="*/ 187325 h 269081"/>
+                <a:gd name="connsiteX5" fmla="*/ 658812 w 713581"/>
+                <a:gd name="connsiteY5" fmla="*/ 247650 h 269081"/>
+                <a:gd name="connsiteX6" fmla="*/ 713581 w 713581"/>
+                <a:gd name="connsiteY6" fmla="*/ 0 h 269081"/>
+                <a:gd name="connsiteX7" fmla="*/ 3175 w 713581"/>
+                <a:gd name="connsiteY7" fmla="*/ 0 h 269081"/>
+                <a:gd name="connsiteX0" fmla="*/ 3175 w 716756"/>
+                <a:gd name="connsiteY0" fmla="*/ 0 h 269081"/>
+                <a:gd name="connsiteX1" fmla="*/ 0 w 716756"/>
+                <a:gd name="connsiteY1" fmla="*/ 269081 h 269081"/>
+                <a:gd name="connsiteX2" fmla="*/ 55562 w 716756"/>
+                <a:gd name="connsiteY2" fmla="*/ 266700 h 269081"/>
+                <a:gd name="connsiteX3" fmla="*/ 134937 w 716756"/>
+                <a:gd name="connsiteY3" fmla="*/ 187325 h 269081"/>
+                <a:gd name="connsiteX4" fmla="*/ 598487 w 716756"/>
+                <a:gd name="connsiteY4" fmla="*/ 187325 h 269081"/>
+                <a:gd name="connsiteX5" fmla="*/ 658812 w 716756"/>
+                <a:gd name="connsiteY5" fmla="*/ 247650 h 269081"/>
+                <a:gd name="connsiteX6" fmla="*/ 716756 w 716756"/>
+                <a:gd name="connsiteY6" fmla="*/ 238125 h 269081"/>
+                <a:gd name="connsiteX7" fmla="*/ 713581 w 716756"/>
+                <a:gd name="connsiteY7" fmla="*/ 0 h 269081"/>
+                <a:gd name="connsiteX8" fmla="*/ 3175 w 716756"/>
+                <a:gd name="connsiteY8" fmla="*/ 0 h 269081"/>
+                <a:gd name="connsiteX0" fmla="*/ 3175 w 852487"/>
+                <a:gd name="connsiteY0" fmla="*/ 0 h 269081"/>
+                <a:gd name="connsiteX1" fmla="*/ 0 w 852487"/>
+                <a:gd name="connsiteY1" fmla="*/ 269081 h 269081"/>
+                <a:gd name="connsiteX2" fmla="*/ 55562 w 852487"/>
+                <a:gd name="connsiteY2" fmla="*/ 266700 h 269081"/>
+                <a:gd name="connsiteX3" fmla="*/ 134937 w 852487"/>
+                <a:gd name="connsiteY3" fmla="*/ 187325 h 269081"/>
+                <a:gd name="connsiteX4" fmla="*/ 598487 w 852487"/>
+                <a:gd name="connsiteY4" fmla="*/ 187325 h 269081"/>
+                <a:gd name="connsiteX5" fmla="*/ 658812 w 852487"/>
+                <a:gd name="connsiteY5" fmla="*/ 247650 h 269081"/>
+                <a:gd name="connsiteX6" fmla="*/ 852487 w 852487"/>
+                <a:gd name="connsiteY6" fmla="*/ 119063 h 269081"/>
+                <a:gd name="connsiteX7" fmla="*/ 713581 w 852487"/>
+                <a:gd name="connsiteY7" fmla="*/ 0 h 269081"/>
+                <a:gd name="connsiteX8" fmla="*/ 3175 w 852487"/>
+                <a:gd name="connsiteY8" fmla="*/ 0 h 269081"/>
+                <a:gd name="connsiteX0" fmla="*/ 3175 w 714375"/>
+                <a:gd name="connsiteY0" fmla="*/ 0 h 269081"/>
+                <a:gd name="connsiteX1" fmla="*/ 0 w 714375"/>
+                <a:gd name="connsiteY1" fmla="*/ 269081 h 269081"/>
+                <a:gd name="connsiteX2" fmla="*/ 55562 w 714375"/>
+                <a:gd name="connsiteY2" fmla="*/ 266700 h 269081"/>
+                <a:gd name="connsiteX3" fmla="*/ 134937 w 714375"/>
+                <a:gd name="connsiteY3" fmla="*/ 187325 h 269081"/>
+                <a:gd name="connsiteX4" fmla="*/ 598487 w 714375"/>
+                <a:gd name="connsiteY4" fmla="*/ 187325 h 269081"/>
+                <a:gd name="connsiteX5" fmla="*/ 658812 w 714375"/>
+                <a:gd name="connsiteY5" fmla="*/ 247650 h 269081"/>
+                <a:gd name="connsiteX6" fmla="*/ 714375 w 714375"/>
+                <a:gd name="connsiteY6" fmla="*/ 240507 h 269081"/>
+                <a:gd name="connsiteX7" fmla="*/ 713581 w 714375"/>
+                <a:gd name="connsiteY7" fmla="*/ 0 h 269081"/>
+                <a:gd name="connsiteX8" fmla="*/ 3175 w 714375"/>
+                <a:gd name="connsiteY8" fmla="*/ 0 h 269081"/>
+              </a:gdLst>
+              <a:ahLst/>
+              <a:cxnLst>
+                <a:cxn ang="0">
+                  <a:pos x="connsiteX0" y="connsiteY0"/>
+                </a:cxn>
+                <a:cxn ang="0">
+                  <a:pos x="connsiteX1" y="connsiteY1"/>
+                </a:cxn>
+                <a:cxn ang="0">
+                  <a:pos x="connsiteX2" y="connsiteY2"/>
+                </a:cxn>
+                <a:cxn ang="0">
+                  <a:pos x="connsiteX3" y="connsiteY3"/>
+                </a:cxn>
+                <a:cxn ang="0">
+                  <a:pos x="connsiteX4" y="connsiteY4"/>
+                </a:cxn>
+                <a:cxn ang="0">
+                  <a:pos x="connsiteX5" y="connsiteY5"/>
+                </a:cxn>
+                <a:cxn ang="0">
+                  <a:pos x="connsiteX6" y="connsiteY6"/>
+                </a:cxn>
+                <a:cxn ang="0">
+                  <a:pos x="connsiteX7" y="connsiteY7"/>
+                </a:cxn>
+                <a:cxn ang="0">
+                  <a:pos x="connsiteX8" y="connsiteY8"/>
+                </a:cxn>
+              </a:cxnLst>
+              <a:rect l="l" t="t" r="r" b="b"/>
+              <a:pathLst>
+                <a:path w="714375" h="269081">
+                  <a:moveTo>
+                    <a:pt x="3175" y="0"/>
+                  </a:moveTo>
+                  <a:cubicBezTo>
+                    <a:pt x="2117" y="57150"/>
+                    <a:pt x="1058" y="211931"/>
+                    <a:pt x="0" y="269081"/>
+                  </a:cubicBezTo>
+                  <a:lnTo>
+                    <a:pt x="55562" y="266700"/>
+                  </a:lnTo>
+                  <a:lnTo>
+                    <a:pt x="134937" y="187325"/>
+                  </a:lnTo>
+                  <a:lnTo>
+                    <a:pt x="598487" y="187325"/>
+                  </a:lnTo>
+                  <a:lnTo>
+                    <a:pt x="658812" y="247650"/>
+                  </a:lnTo>
+                  <a:cubicBezTo>
+                    <a:pt x="660664" y="237331"/>
+                    <a:pt x="712523" y="250826"/>
+                    <a:pt x="714375" y="240507"/>
+                  </a:cubicBezTo>
+                  <a:cubicBezTo>
+                    <a:pt x="713317" y="161132"/>
+                    <a:pt x="714639" y="79375"/>
+                    <a:pt x="713581" y="0"/>
+                  </a:cubicBezTo>
+                  <a:lnTo>
+                    <a:pt x="3175" y="0"/>
+                  </a:lnTo>
+                  <a:close/>
+                </a:path>
+              </a:pathLst>
+            </a:custGeom>
+            <a:solidFill>
+              <a:schemeClr val="bg1">
+                <a:lumMod val="95000"/>
+              </a:schemeClr>
+            </a:solidFill>
+            <a:ln>
+              <a:solidFill>
+                <a:schemeClr val="tx1"/>
+              </a:solidFill>
+            </a:ln>
+          </p:spPr>
+          <p:style>
+            <a:lnRef idx="2">
+              <a:schemeClr val="accent1">
+                <a:shade val="50000"/>
+              </a:schemeClr>
+            </a:lnRef>
+            <a:fillRef idx="1">
+              <a:schemeClr val="accent1"/>
+            </a:fillRef>
+            <a:effectRef idx="0">
+              <a:schemeClr val="accent1"/>
+            </a:effectRef>
+            <a:fontRef idx="minor">
+              <a:schemeClr val="lt1"/>
+            </a:fontRef>
+          </p:style>
+          <p:txBody>
+            <a:bodyPr rtlCol="0" anchor="ctr"/>
+            <a:lstStyle/>
+            <a:p>
+              <a:pPr algn="ctr"/>
+              <a:endParaRPr lang="en-NZ"/>
+            </a:p>
+          </p:txBody>
+        </p:sp>
+        <p:sp>
+          <p:nvSpPr>
+            <p:cNvPr id="4" name="Freeform 3"/>
+            <p:cNvSpPr/>
+            <p:nvPr/>
+          </p:nvSpPr>
+          <p:spPr>
+            <a:xfrm>
+              <a:off x="1139428" y="2781300"/>
+              <a:ext cx="1445418" cy="2095500"/>
+            </a:xfrm>
+            <a:custGeom>
+              <a:avLst/>
+              <a:gdLst>
+                <a:gd name="connsiteX0" fmla="*/ 0 w 1443037"/>
+                <a:gd name="connsiteY0" fmla="*/ 0 h 2095500"/>
+                <a:gd name="connsiteX1" fmla="*/ 0 w 1443037"/>
+                <a:gd name="connsiteY1" fmla="*/ 357187 h 2095500"/>
+                <a:gd name="connsiteX2" fmla="*/ 138112 w 1443037"/>
+                <a:gd name="connsiteY2" fmla="*/ 495299 h 2095500"/>
+                <a:gd name="connsiteX3" fmla="*/ 4762 w 1443037"/>
+                <a:gd name="connsiteY3" fmla="*/ 628649 h 2095500"/>
+                <a:gd name="connsiteX4" fmla="*/ 4762 w 1443037"/>
+                <a:gd name="connsiteY4" fmla="*/ 2095500 h 2095500"/>
+                <a:gd name="connsiteX5" fmla="*/ 1443037 w 1443037"/>
+                <a:gd name="connsiteY5" fmla="*/ 2095500 h 2095500"/>
+                <a:gd name="connsiteX6" fmla="*/ 1443037 w 1443037"/>
+                <a:gd name="connsiteY6" fmla="*/ 652462 h 2095500"/>
+                <a:gd name="connsiteX7" fmla="*/ 1285875 w 1443037"/>
+                <a:gd name="connsiteY7" fmla="*/ 495300 h 2095500"/>
+                <a:gd name="connsiteX8" fmla="*/ 1443037 w 1443037"/>
+                <a:gd name="connsiteY8" fmla="*/ 338138 h 2095500"/>
+                <a:gd name="connsiteX9" fmla="*/ 1443037 w 1443037"/>
+                <a:gd name="connsiteY9" fmla="*/ 9525 h 2095500"/>
+                <a:gd name="connsiteX10" fmla="*/ 0 w 1443037"/>
+                <a:gd name="connsiteY10" fmla="*/ 0 h 2095500"/>
+                <a:gd name="connsiteX0" fmla="*/ 2381 w 1445418"/>
+                <a:gd name="connsiteY0" fmla="*/ 0 h 2095500"/>
+                <a:gd name="connsiteX1" fmla="*/ 0 w 1445418"/>
+                <a:gd name="connsiteY1" fmla="*/ 338137 h 2095500"/>
+                <a:gd name="connsiteX2" fmla="*/ 140493 w 1445418"/>
+                <a:gd name="connsiteY2" fmla="*/ 495299 h 2095500"/>
+                <a:gd name="connsiteX3" fmla="*/ 7143 w 1445418"/>
+                <a:gd name="connsiteY3" fmla="*/ 628649 h 2095500"/>
+                <a:gd name="connsiteX4" fmla="*/ 7143 w 1445418"/>
+                <a:gd name="connsiteY4" fmla="*/ 2095500 h 2095500"/>
+                <a:gd name="connsiteX5" fmla="*/ 1445418 w 1445418"/>
+                <a:gd name="connsiteY5" fmla="*/ 2095500 h 2095500"/>
+                <a:gd name="connsiteX6" fmla="*/ 1445418 w 1445418"/>
+                <a:gd name="connsiteY6" fmla="*/ 652462 h 2095500"/>
+                <a:gd name="connsiteX7" fmla="*/ 1288256 w 1445418"/>
+                <a:gd name="connsiteY7" fmla="*/ 495300 h 2095500"/>
+                <a:gd name="connsiteX8" fmla="*/ 1445418 w 1445418"/>
+                <a:gd name="connsiteY8" fmla="*/ 338138 h 2095500"/>
+                <a:gd name="connsiteX9" fmla="*/ 1445418 w 1445418"/>
+                <a:gd name="connsiteY9" fmla="*/ 9525 h 2095500"/>
+                <a:gd name="connsiteX10" fmla="*/ 2381 w 1445418"/>
+                <a:gd name="connsiteY10" fmla="*/ 0 h 2095500"/>
+                <a:gd name="connsiteX0" fmla="*/ 2381 w 1445418"/>
+                <a:gd name="connsiteY0" fmla="*/ 0 h 2095500"/>
+                <a:gd name="connsiteX1" fmla="*/ 0 w 1445418"/>
+                <a:gd name="connsiteY1" fmla="*/ 338137 h 2095500"/>
+                <a:gd name="connsiteX2" fmla="*/ 140493 w 1445418"/>
+                <a:gd name="connsiteY2" fmla="*/ 495299 h 2095500"/>
+                <a:gd name="connsiteX3" fmla="*/ 7143 w 1445418"/>
+                <a:gd name="connsiteY3" fmla="*/ 657224 h 2095500"/>
+                <a:gd name="connsiteX4" fmla="*/ 7143 w 1445418"/>
+                <a:gd name="connsiteY4" fmla="*/ 2095500 h 2095500"/>
+                <a:gd name="connsiteX5" fmla="*/ 1445418 w 1445418"/>
+                <a:gd name="connsiteY5" fmla="*/ 2095500 h 2095500"/>
+                <a:gd name="connsiteX6" fmla="*/ 1445418 w 1445418"/>
+                <a:gd name="connsiteY6" fmla="*/ 652462 h 2095500"/>
+                <a:gd name="connsiteX7" fmla="*/ 1288256 w 1445418"/>
+                <a:gd name="connsiteY7" fmla="*/ 495300 h 2095500"/>
+                <a:gd name="connsiteX8" fmla="*/ 1445418 w 1445418"/>
+                <a:gd name="connsiteY8" fmla="*/ 338138 h 2095500"/>
+                <a:gd name="connsiteX9" fmla="*/ 1445418 w 1445418"/>
+                <a:gd name="connsiteY9" fmla="*/ 9525 h 2095500"/>
+                <a:gd name="connsiteX10" fmla="*/ 2381 w 1445418"/>
+                <a:gd name="connsiteY10" fmla="*/ 0 h 2095500"/>
+                <a:gd name="connsiteX0" fmla="*/ 2381 w 1445418"/>
+                <a:gd name="connsiteY0" fmla="*/ 0 h 2095500"/>
+                <a:gd name="connsiteX1" fmla="*/ 0 w 1445418"/>
+                <a:gd name="connsiteY1" fmla="*/ 338137 h 2095500"/>
+                <a:gd name="connsiteX2" fmla="*/ 150018 w 1445418"/>
+                <a:gd name="connsiteY2" fmla="*/ 492918 h 2095500"/>
+                <a:gd name="connsiteX3" fmla="*/ 7143 w 1445418"/>
+                <a:gd name="connsiteY3" fmla="*/ 657224 h 2095500"/>
+                <a:gd name="connsiteX4" fmla="*/ 7143 w 1445418"/>
+                <a:gd name="connsiteY4" fmla="*/ 2095500 h 2095500"/>
+                <a:gd name="connsiteX5" fmla="*/ 1445418 w 1445418"/>
+                <a:gd name="connsiteY5" fmla="*/ 2095500 h 2095500"/>
+                <a:gd name="connsiteX6" fmla="*/ 1445418 w 1445418"/>
+                <a:gd name="connsiteY6" fmla="*/ 652462 h 2095500"/>
+                <a:gd name="connsiteX7" fmla="*/ 1288256 w 1445418"/>
+                <a:gd name="connsiteY7" fmla="*/ 495300 h 2095500"/>
+                <a:gd name="connsiteX8" fmla="*/ 1445418 w 1445418"/>
+                <a:gd name="connsiteY8" fmla="*/ 338138 h 2095500"/>
+                <a:gd name="connsiteX9" fmla="*/ 1445418 w 1445418"/>
+                <a:gd name="connsiteY9" fmla="*/ 9525 h 2095500"/>
+                <a:gd name="connsiteX10" fmla="*/ 2381 w 1445418"/>
+                <a:gd name="connsiteY10" fmla="*/ 0 h 2095500"/>
+                <a:gd name="connsiteX0" fmla="*/ 2381 w 1445418"/>
+                <a:gd name="connsiteY0" fmla="*/ 0 h 2095500"/>
+                <a:gd name="connsiteX1" fmla="*/ 0 w 1445418"/>
+                <a:gd name="connsiteY1" fmla="*/ 338137 h 2095500"/>
+                <a:gd name="connsiteX2" fmla="*/ 159543 w 1445418"/>
+                <a:gd name="connsiteY2" fmla="*/ 492918 h 2095500"/>
+                <a:gd name="connsiteX3" fmla="*/ 7143 w 1445418"/>
+                <a:gd name="connsiteY3" fmla="*/ 657224 h 2095500"/>
+                <a:gd name="connsiteX4" fmla="*/ 7143 w 1445418"/>
+                <a:gd name="connsiteY4" fmla="*/ 2095500 h 2095500"/>
+                <a:gd name="connsiteX5" fmla="*/ 1445418 w 1445418"/>
+                <a:gd name="connsiteY5" fmla="*/ 2095500 h 2095500"/>
+                <a:gd name="connsiteX6" fmla="*/ 1445418 w 1445418"/>
+                <a:gd name="connsiteY6" fmla="*/ 652462 h 2095500"/>
+                <a:gd name="connsiteX7" fmla="*/ 1288256 w 1445418"/>
+                <a:gd name="connsiteY7" fmla="*/ 495300 h 2095500"/>
+                <a:gd name="connsiteX8" fmla="*/ 1445418 w 1445418"/>
+                <a:gd name="connsiteY8" fmla="*/ 338138 h 2095500"/>
+                <a:gd name="connsiteX9" fmla="*/ 1445418 w 1445418"/>
+                <a:gd name="connsiteY9" fmla="*/ 9525 h 2095500"/>
+                <a:gd name="connsiteX10" fmla="*/ 2381 w 1445418"/>
+                <a:gd name="connsiteY10" fmla="*/ 0 h 2095500"/>
+              </a:gdLst>
+              <a:ahLst/>
+              <a:cxnLst>
+                <a:cxn ang="0">
+                  <a:pos x="connsiteX0" y="connsiteY0"/>
+                </a:cxn>
+                <a:cxn ang="0">
+                  <a:pos x="connsiteX1" y="connsiteY1"/>
+                </a:cxn>
+                <a:cxn ang="0">
+                  <a:pos x="connsiteX2" y="connsiteY2"/>
+                </a:cxn>
+                <a:cxn ang="0">
+                  <a:pos x="connsiteX3" y="connsiteY3"/>
+                </a:cxn>
+                <a:cxn ang="0">
+                  <a:pos x="connsiteX4" y="connsiteY4"/>
+                </a:cxn>
+                <a:cxn ang="0">
+                  <a:pos x="connsiteX5" y="connsiteY5"/>
+                </a:cxn>
+                <a:cxn ang="0">
+                  <a:pos x="connsiteX6" y="connsiteY6"/>
+                </a:cxn>
+                <a:cxn ang="0">
+                  <a:pos x="connsiteX7" y="connsiteY7"/>
+                </a:cxn>
+                <a:cxn ang="0">
+                  <a:pos x="connsiteX8" y="connsiteY8"/>
+                </a:cxn>
+                <a:cxn ang="0">
+                  <a:pos x="connsiteX9" y="connsiteY9"/>
+                </a:cxn>
+                <a:cxn ang="0">
+                  <a:pos x="connsiteX10" y="connsiteY10"/>
+                </a:cxn>
+              </a:cxnLst>
+              <a:rect l="l" t="t" r="r" b="b"/>
+              <a:pathLst>
+                <a:path w="1445418" h="2095500">
+                  <a:moveTo>
+                    <a:pt x="2381" y="0"/>
+                  </a:moveTo>
+                  <a:cubicBezTo>
+                    <a:pt x="1587" y="112712"/>
+                    <a:pt x="794" y="225425"/>
+                    <a:pt x="0" y="338137"/>
+                  </a:cubicBezTo>
+                  <a:lnTo>
+                    <a:pt x="159543" y="492918"/>
+                  </a:lnTo>
+                  <a:lnTo>
+                    <a:pt x="7143" y="657224"/>
+                  </a:lnTo>
+                  <a:lnTo>
+                    <a:pt x="7143" y="2095500"/>
+                  </a:lnTo>
+                  <a:lnTo>
+                    <a:pt x="1445418" y="2095500"/>
+                  </a:lnTo>
+                  <a:lnTo>
+                    <a:pt x="1445418" y="652462"/>
+                  </a:lnTo>
+                  <a:lnTo>
+                    <a:pt x="1288256" y="495300"/>
+                  </a:lnTo>
+                  <a:lnTo>
+                    <a:pt x="1445418" y="338138"/>
+                  </a:lnTo>
+                  <a:lnTo>
+                    <a:pt x="1445418" y="9525"/>
+                  </a:lnTo>
+                  <a:lnTo>
+                    <a:pt x="2381" y="0"/>
+                  </a:lnTo>
+                  <a:close/>
+                </a:path>
+              </a:pathLst>
+            </a:custGeom>
+            <a:solidFill>
+              <a:schemeClr val="bg1">
+                <a:lumMod val="95000"/>
+              </a:schemeClr>
+            </a:solidFill>
+            <a:ln>
+              <a:solidFill>
+                <a:schemeClr val="tx1"/>
+              </a:solidFill>
+            </a:ln>
+          </p:spPr>
+          <p:style>
+            <a:lnRef idx="2">
+              <a:schemeClr val="accent1">
+                <a:shade val="50000"/>
+              </a:schemeClr>
+            </a:lnRef>
+            <a:fillRef idx="1">
+              <a:schemeClr val="accent1"/>
+            </a:fillRef>
+            <a:effectRef idx="0">
+              <a:schemeClr val="accent1"/>
+            </a:effectRef>
+            <a:fontRef idx="minor">
+              <a:schemeClr val="lt1"/>
+            </a:fontRef>
+          </p:style>
+          <p:txBody>
+            <a:bodyPr rtlCol="0" anchor="ctr"/>
+            <a:lstStyle/>
+            <a:p>
+              <a:pPr algn="ctr"/>
+              <a:endParaRPr lang="en-NZ"/>
+            </a:p>
+          </p:txBody>
+        </p:sp>
+        <p:sp>
+          <p:nvSpPr>
+            <p:cNvPr id="14" name="Freeform 13"/>
+            <p:cNvSpPr/>
+            <p:nvPr/>
+          </p:nvSpPr>
+          <p:spPr>
+            <a:xfrm>
+              <a:off x="6386512" y="2550318"/>
+              <a:ext cx="714375" cy="269081"/>
+            </a:xfrm>
+            <a:custGeom>
+              <a:avLst/>
+              <a:gdLst>
+                <a:gd name="connsiteX0" fmla="*/ 0 w 603250"/>
+                <a:gd name="connsiteY0" fmla="*/ 0 h 266700"/>
+                <a:gd name="connsiteX1" fmla="*/ 0 w 603250"/>
+                <a:gd name="connsiteY1" fmla="*/ 266700 h 266700"/>
+                <a:gd name="connsiteX2" fmla="*/ 79375 w 603250"/>
+                <a:gd name="connsiteY2" fmla="*/ 187325 h 266700"/>
+                <a:gd name="connsiteX3" fmla="*/ 542925 w 603250"/>
+                <a:gd name="connsiteY3" fmla="*/ 187325 h 266700"/>
+                <a:gd name="connsiteX4" fmla="*/ 603250 w 603250"/>
+                <a:gd name="connsiteY4" fmla="*/ 247650 h 266700"/>
+                <a:gd name="connsiteX5" fmla="*/ 603250 w 603250"/>
+                <a:gd name="connsiteY5" fmla="*/ 0 h 266700"/>
+                <a:gd name="connsiteX6" fmla="*/ 0 w 603250"/>
+                <a:gd name="connsiteY6" fmla="*/ 0 h 266700"/>
+                <a:gd name="connsiteX0" fmla="*/ 55562 w 658812"/>
+                <a:gd name="connsiteY0" fmla="*/ 0 h 269081"/>
+                <a:gd name="connsiteX1" fmla="*/ 0 w 658812"/>
+                <a:gd name="connsiteY1" fmla="*/ 269081 h 269081"/>
+                <a:gd name="connsiteX2" fmla="*/ 55562 w 658812"/>
+                <a:gd name="connsiteY2" fmla="*/ 266700 h 269081"/>
+                <a:gd name="connsiteX3" fmla="*/ 134937 w 658812"/>
+                <a:gd name="connsiteY3" fmla="*/ 187325 h 269081"/>
+                <a:gd name="connsiteX4" fmla="*/ 598487 w 658812"/>
+                <a:gd name="connsiteY4" fmla="*/ 187325 h 269081"/>
+                <a:gd name="connsiteX5" fmla="*/ 658812 w 658812"/>
+                <a:gd name="connsiteY5" fmla="*/ 247650 h 269081"/>
+                <a:gd name="connsiteX6" fmla="*/ 658812 w 658812"/>
+                <a:gd name="connsiteY6" fmla="*/ 0 h 269081"/>
+                <a:gd name="connsiteX7" fmla="*/ 55562 w 658812"/>
+                <a:gd name="connsiteY7" fmla="*/ 0 h 269081"/>
+                <a:gd name="connsiteX0" fmla="*/ 3175 w 658812"/>
+                <a:gd name="connsiteY0" fmla="*/ 0 h 269081"/>
+                <a:gd name="connsiteX1" fmla="*/ 0 w 658812"/>
+                <a:gd name="connsiteY1" fmla="*/ 269081 h 269081"/>
+                <a:gd name="connsiteX2" fmla="*/ 55562 w 658812"/>
+                <a:gd name="connsiteY2" fmla="*/ 266700 h 269081"/>
+                <a:gd name="connsiteX3" fmla="*/ 134937 w 658812"/>
+                <a:gd name="connsiteY3" fmla="*/ 187325 h 269081"/>
+                <a:gd name="connsiteX4" fmla="*/ 598487 w 658812"/>
+                <a:gd name="connsiteY4" fmla="*/ 187325 h 269081"/>
+                <a:gd name="connsiteX5" fmla="*/ 658812 w 658812"/>
+                <a:gd name="connsiteY5" fmla="*/ 247650 h 269081"/>
+                <a:gd name="connsiteX6" fmla="*/ 658812 w 658812"/>
+                <a:gd name="connsiteY6" fmla="*/ 0 h 269081"/>
+                <a:gd name="connsiteX7" fmla="*/ 3175 w 658812"/>
+                <a:gd name="connsiteY7" fmla="*/ 0 h 269081"/>
+                <a:gd name="connsiteX0" fmla="*/ 3175 w 713581"/>
+                <a:gd name="connsiteY0" fmla="*/ 0 h 269081"/>
+                <a:gd name="connsiteX1" fmla="*/ 0 w 713581"/>
+                <a:gd name="connsiteY1" fmla="*/ 269081 h 269081"/>
+                <a:gd name="connsiteX2" fmla="*/ 55562 w 713581"/>
+                <a:gd name="connsiteY2" fmla="*/ 266700 h 269081"/>
+                <a:gd name="connsiteX3" fmla="*/ 134937 w 713581"/>
+                <a:gd name="connsiteY3" fmla="*/ 187325 h 269081"/>
+                <a:gd name="connsiteX4" fmla="*/ 598487 w 713581"/>
+                <a:gd name="connsiteY4" fmla="*/ 187325 h 269081"/>
+                <a:gd name="connsiteX5" fmla="*/ 658812 w 713581"/>
+                <a:gd name="connsiteY5" fmla="*/ 247650 h 269081"/>
+                <a:gd name="connsiteX6" fmla="*/ 713581 w 713581"/>
+                <a:gd name="connsiteY6" fmla="*/ 0 h 269081"/>
+                <a:gd name="connsiteX7" fmla="*/ 3175 w 713581"/>
+                <a:gd name="connsiteY7" fmla="*/ 0 h 269081"/>
+                <a:gd name="connsiteX0" fmla="*/ 3175 w 716756"/>
+                <a:gd name="connsiteY0" fmla="*/ 0 h 269081"/>
+                <a:gd name="connsiteX1" fmla="*/ 0 w 716756"/>
+                <a:gd name="connsiteY1" fmla="*/ 269081 h 269081"/>
+                <a:gd name="connsiteX2" fmla="*/ 55562 w 716756"/>
+                <a:gd name="connsiteY2" fmla="*/ 266700 h 269081"/>
+                <a:gd name="connsiteX3" fmla="*/ 134937 w 716756"/>
+                <a:gd name="connsiteY3" fmla="*/ 187325 h 269081"/>
+                <a:gd name="connsiteX4" fmla="*/ 598487 w 716756"/>
+                <a:gd name="connsiteY4" fmla="*/ 187325 h 269081"/>
+                <a:gd name="connsiteX5" fmla="*/ 658812 w 716756"/>
+                <a:gd name="connsiteY5" fmla="*/ 247650 h 269081"/>
+                <a:gd name="connsiteX6" fmla="*/ 716756 w 716756"/>
+                <a:gd name="connsiteY6" fmla="*/ 238125 h 269081"/>
+                <a:gd name="connsiteX7" fmla="*/ 713581 w 716756"/>
+                <a:gd name="connsiteY7" fmla="*/ 0 h 269081"/>
+                <a:gd name="connsiteX8" fmla="*/ 3175 w 716756"/>
+                <a:gd name="connsiteY8" fmla="*/ 0 h 269081"/>
+                <a:gd name="connsiteX0" fmla="*/ 3175 w 852487"/>
+                <a:gd name="connsiteY0" fmla="*/ 0 h 269081"/>
+                <a:gd name="connsiteX1" fmla="*/ 0 w 852487"/>
+                <a:gd name="connsiteY1" fmla="*/ 269081 h 269081"/>
+                <a:gd name="connsiteX2" fmla="*/ 55562 w 852487"/>
+                <a:gd name="connsiteY2" fmla="*/ 266700 h 269081"/>
+                <a:gd name="connsiteX3" fmla="*/ 134937 w 852487"/>
+                <a:gd name="connsiteY3" fmla="*/ 187325 h 269081"/>
+                <a:gd name="connsiteX4" fmla="*/ 598487 w 852487"/>
+                <a:gd name="connsiteY4" fmla="*/ 187325 h 269081"/>
+                <a:gd name="connsiteX5" fmla="*/ 658812 w 852487"/>
+                <a:gd name="connsiteY5" fmla="*/ 247650 h 269081"/>
+                <a:gd name="connsiteX6" fmla="*/ 852487 w 852487"/>
+                <a:gd name="connsiteY6" fmla="*/ 119063 h 269081"/>
+                <a:gd name="connsiteX7" fmla="*/ 713581 w 852487"/>
+                <a:gd name="connsiteY7" fmla="*/ 0 h 269081"/>
+                <a:gd name="connsiteX8" fmla="*/ 3175 w 852487"/>
+                <a:gd name="connsiteY8" fmla="*/ 0 h 269081"/>
+                <a:gd name="connsiteX0" fmla="*/ 3175 w 714375"/>
+                <a:gd name="connsiteY0" fmla="*/ 0 h 269081"/>
+                <a:gd name="connsiteX1" fmla="*/ 0 w 714375"/>
+                <a:gd name="connsiteY1" fmla="*/ 269081 h 269081"/>
+                <a:gd name="connsiteX2" fmla="*/ 55562 w 714375"/>
+                <a:gd name="connsiteY2" fmla="*/ 266700 h 269081"/>
+                <a:gd name="connsiteX3" fmla="*/ 134937 w 714375"/>
+                <a:gd name="connsiteY3" fmla="*/ 187325 h 269081"/>
+                <a:gd name="connsiteX4" fmla="*/ 598487 w 714375"/>
+                <a:gd name="connsiteY4" fmla="*/ 187325 h 269081"/>
+                <a:gd name="connsiteX5" fmla="*/ 658812 w 714375"/>
+                <a:gd name="connsiteY5" fmla="*/ 247650 h 269081"/>
+                <a:gd name="connsiteX6" fmla="*/ 714375 w 714375"/>
+                <a:gd name="connsiteY6" fmla="*/ 240507 h 269081"/>
+                <a:gd name="connsiteX7" fmla="*/ 713581 w 714375"/>
+                <a:gd name="connsiteY7" fmla="*/ 0 h 269081"/>
+                <a:gd name="connsiteX8" fmla="*/ 3175 w 714375"/>
+                <a:gd name="connsiteY8" fmla="*/ 0 h 269081"/>
+              </a:gdLst>
+              <a:ahLst/>
+              <a:cxnLst>
+                <a:cxn ang="0">
+                  <a:pos x="connsiteX0" y="connsiteY0"/>
+                </a:cxn>
+                <a:cxn ang="0">
+                  <a:pos x="connsiteX1" y="connsiteY1"/>
+                </a:cxn>
+                <a:cxn ang="0">
+                  <a:pos x="connsiteX2" y="connsiteY2"/>
+                </a:cxn>
+                <a:cxn ang="0">
+                  <a:pos x="connsiteX3" y="connsiteY3"/>
+                </a:cxn>
+                <a:cxn ang="0">
+                  <a:pos x="connsiteX4" y="connsiteY4"/>
+                </a:cxn>
+                <a:cxn ang="0">
+                  <a:pos x="connsiteX5" y="connsiteY5"/>
+                </a:cxn>
+                <a:cxn ang="0">
+                  <a:pos x="connsiteX6" y="connsiteY6"/>
+                </a:cxn>
+                <a:cxn ang="0">
+                  <a:pos x="connsiteX7" y="connsiteY7"/>
+                </a:cxn>
+                <a:cxn ang="0">
+                  <a:pos x="connsiteX8" y="connsiteY8"/>
+                </a:cxn>
+              </a:cxnLst>
+              <a:rect l="l" t="t" r="r" b="b"/>
+              <a:pathLst>
+                <a:path w="714375" h="269081">
+                  <a:moveTo>
+                    <a:pt x="3175" y="0"/>
+                  </a:moveTo>
+                  <a:cubicBezTo>
+                    <a:pt x="2117" y="57150"/>
+                    <a:pt x="1058" y="211931"/>
+                    <a:pt x="0" y="269081"/>
+                  </a:cubicBezTo>
+                  <a:lnTo>
+                    <a:pt x="55562" y="266700"/>
+                  </a:lnTo>
+                  <a:lnTo>
+                    <a:pt x="134937" y="187325"/>
+                  </a:lnTo>
+                  <a:lnTo>
+                    <a:pt x="598487" y="187325"/>
+                  </a:lnTo>
+                  <a:lnTo>
+                    <a:pt x="658812" y="247650"/>
+                  </a:lnTo>
+                  <a:cubicBezTo>
+                    <a:pt x="660664" y="237331"/>
+                    <a:pt x="712523" y="250826"/>
+                    <a:pt x="714375" y="240507"/>
+                  </a:cubicBezTo>
+                  <a:cubicBezTo>
+                    <a:pt x="713317" y="161132"/>
+                    <a:pt x="714639" y="79375"/>
+                    <a:pt x="713581" y="0"/>
+                  </a:cubicBezTo>
+                  <a:lnTo>
+                    <a:pt x="3175" y="0"/>
+                  </a:lnTo>
+                  <a:close/>
+                </a:path>
+              </a:pathLst>
+            </a:custGeom>
+            <a:solidFill>
+              <a:schemeClr val="bg1">
+                <a:lumMod val="95000"/>
+              </a:schemeClr>
+            </a:solidFill>
+            <a:ln>
+              <a:solidFill>
+                <a:schemeClr val="tx1"/>
+              </a:solidFill>
+            </a:ln>
+          </p:spPr>
+          <p:style>
+            <a:lnRef idx="2">
+              <a:schemeClr val="accent1">
+                <a:shade val="50000"/>
+              </a:schemeClr>
+            </a:lnRef>
+            <a:fillRef idx="1">
+              <a:schemeClr val="accent1"/>
+            </a:fillRef>
+            <a:effectRef idx="0">
+              <a:schemeClr val="accent1"/>
+            </a:effectRef>
+            <a:fontRef idx="minor">
+              <a:schemeClr val="lt1"/>
+            </a:fontRef>
+          </p:style>
+          <p:txBody>
+            <a:bodyPr rtlCol="0" anchor="ctr"/>
+            <a:lstStyle/>
+            <a:p>
+              <a:pPr algn="ctr"/>
+              <a:endParaRPr lang="en-NZ"/>
+            </a:p>
+          </p:txBody>
+        </p:sp>
+        <p:sp>
+          <p:nvSpPr>
+            <p:cNvPr id="15" name="Freeform 14"/>
+            <p:cNvSpPr/>
+            <p:nvPr/>
+          </p:nvSpPr>
+          <p:spPr>
+            <a:xfrm rot="5400000">
+              <a:off x="6192441" y="2494359"/>
+              <a:ext cx="1445418" cy="2095500"/>
+            </a:xfrm>
+            <a:custGeom>
+              <a:avLst/>
+              <a:gdLst>
+                <a:gd name="connsiteX0" fmla="*/ 0 w 1443037"/>
+                <a:gd name="connsiteY0" fmla="*/ 0 h 2095500"/>
+                <a:gd name="connsiteX1" fmla="*/ 0 w 1443037"/>
+                <a:gd name="connsiteY1" fmla="*/ 357187 h 2095500"/>
+                <a:gd name="connsiteX2" fmla="*/ 138112 w 1443037"/>
+                <a:gd name="connsiteY2" fmla="*/ 495299 h 2095500"/>
+                <a:gd name="connsiteX3" fmla="*/ 4762 w 1443037"/>
+                <a:gd name="connsiteY3" fmla="*/ 628649 h 2095500"/>
+                <a:gd name="connsiteX4" fmla="*/ 4762 w 1443037"/>
+                <a:gd name="connsiteY4" fmla="*/ 2095500 h 2095500"/>
+                <a:gd name="connsiteX5" fmla="*/ 1443037 w 1443037"/>
+                <a:gd name="connsiteY5" fmla="*/ 2095500 h 2095500"/>
+                <a:gd name="connsiteX6" fmla="*/ 1443037 w 1443037"/>
+                <a:gd name="connsiteY6" fmla="*/ 652462 h 2095500"/>
+                <a:gd name="connsiteX7" fmla="*/ 1285875 w 1443037"/>
+                <a:gd name="connsiteY7" fmla="*/ 495300 h 2095500"/>
+                <a:gd name="connsiteX8" fmla="*/ 1443037 w 1443037"/>
+                <a:gd name="connsiteY8" fmla="*/ 338138 h 2095500"/>
+                <a:gd name="connsiteX9" fmla="*/ 1443037 w 1443037"/>
+                <a:gd name="connsiteY9" fmla="*/ 9525 h 2095500"/>
+                <a:gd name="connsiteX10" fmla="*/ 0 w 1443037"/>
+                <a:gd name="connsiteY10" fmla="*/ 0 h 2095500"/>
+                <a:gd name="connsiteX0" fmla="*/ 2381 w 1445418"/>
+                <a:gd name="connsiteY0" fmla="*/ 0 h 2095500"/>
+                <a:gd name="connsiteX1" fmla="*/ 0 w 1445418"/>
+                <a:gd name="connsiteY1" fmla="*/ 338137 h 2095500"/>
+                <a:gd name="connsiteX2" fmla="*/ 140493 w 1445418"/>
+                <a:gd name="connsiteY2" fmla="*/ 495299 h 2095500"/>
+                <a:gd name="connsiteX3" fmla="*/ 7143 w 1445418"/>
+                <a:gd name="connsiteY3" fmla="*/ 628649 h 2095500"/>
+                <a:gd name="connsiteX4" fmla="*/ 7143 w 1445418"/>
+                <a:gd name="connsiteY4" fmla="*/ 2095500 h 2095500"/>
+                <a:gd name="connsiteX5" fmla="*/ 1445418 w 1445418"/>
+                <a:gd name="connsiteY5" fmla="*/ 2095500 h 2095500"/>
+                <a:gd name="connsiteX6" fmla="*/ 1445418 w 1445418"/>
+                <a:gd name="connsiteY6" fmla="*/ 652462 h 2095500"/>
+                <a:gd name="connsiteX7" fmla="*/ 1288256 w 1445418"/>
+                <a:gd name="connsiteY7" fmla="*/ 495300 h 2095500"/>
+                <a:gd name="connsiteX8" fmla="*/ 1445418 w 1445418"/>
+                <a:gd name="connsiteY8" fmla="*/ 338138 h 2095500"/>
+                <a:gd name="connsiteX9" fmla="*/ 1445418 w 1445418"/>
+                <a:gd name="connsiteY9" fmla="*/ 9525 h 2095500"/>
+                <a:gd name="connsiteX10" fmla="*/ 2381 w 1445418"/>
+                <a:gd name="connsiteY10" fmla="*/ 0 h 2095500"/>
+                <a:gd name="connsiteX0" fmla="*/ 2381 w 1445418"/>
+                <a:gd name="connsiteY0" fmla="*/ 0 h 2095500"/>
+                <a:gd name="connsiteX1" fmla="*/ 0 w 1445418"/>
+                <a:gd name="connsiteY1" fmla="*/ 338137 h 2095500"/>
+                <a:gd name="connsiteX2" fmla="*/ 140493 w 1445418"/>
+                <a:gd name="connsiteY2" fmla="*/ 495299 h 2095500"/>
+                <a:gd name="connsiteX3" fmla="*/ 7143 w 1445418"/>
+                <a:gd name="connsiteY3" fmla="*/ 657224 h 2095500"/>
+                <a:gd name="connsiteX4" fmla="*/ 7143 w 1445418"/>
+                <a:gd name="connsiteY4" fmla="*/ 2095500 h 2095500"/>
+                <a:gd name="connsiteX5" fmla="*/ 1445418 w 1445418"/>
+                <a:gd name="connsiteY5" fmla="*/ 2095500 h 2095500"/>
+                <a:gd name="connsiteX6" fmla="*/ 1445418 w 1445418"/>
+                <a:gd name="connsiteY6" fmla="*/ 652462 h 2095500"/>
+                <a:gd name="connsiteX7" fmla="*/ 1288256 w 1445418"/>
+                <a:gd name="connsiteY7" fmla="*/ 495300 h 2095500"/>
+                <a:gd name="connsiteX8" fmla="*/ 1445418 w 1445418"/>
+                <a:gd name="connsiteY8" fmla="*/ 338138 h 2095500"/>
+                <a:gd name="connsiteX9" fmla="*/ 1445418 w 1445418"/>
+                <a:gd name="connsiteY9" fmla="*/ 9525 h 2095500"/>
+                <a:gd name="connsiteX10" fmla="*/ 2381 w 1445418"/>
+                <a:gd name="connsiteY10" fmla="*/ 0 h 2095500"/>
+                <a:gd name="connsiteX0" fmla="*/ 2381 w 1445418"/>
+                <a:gd name="connsiteY0" fmla="*/ 0 h 2095500"/>
+                <a:gd name="connsiteX1" fmla="*/ 0 w 1445418"/>
+                <a:gd name="connsiteY1" fmla="*/ 338137 h 2095500"/>
+                <a:gd name="connsiteX2" fmla="*/ 150018 w 1445418"/>
+                <a:gd name="connsiteY2" fmla="*/ 492918 h 2095500"/>
+                <a:gd name="connsiteX3" fmla="*/ 7143 w 1445418"/>
+                <a:gd name="connsiteY3" fmla="*/ 657224 h 2095500"/>
+                <a:gd name="connsiteX4" fmla="*/ 7143 w 1445418"/>
+                <a:gd name="connsiteY4" fmla="*/ 2095500 h 2095500"/>
+                <a:gd name="connsiteX5" fmla="*/ 1445418 w 1445418"/>
+                <a:gd name="connsiteY5" fmla="*/ 2095500 h 2095500"/>
+                <a:gd name="connsiteX6" fmla="*/ 1445418 w 1445418"/>
+                <a:gd name="connsiteY6" fmla="*/ 652462 h 2095500"/>
+                <a:gd name="connsiteX7" fmla="*/ 1288256 w 1445418"/>
+                <a:gd name="connsiteY7" fmla="*/ 495300 h 2095500"/>
+                <a:gd name="connsiteX8" fmla="*/ 1445418 w 1445418"/>
+                <a:gd name="connsiteY8" fmla="*/ 338138 h 2095500"/>
+                <a:gd name="connsiteX9" fmla="*/ 1445418 w 1445418"/>
+                <a:gd name="connsiteY9" fmla="*/ 9525 h 2095500"/>
+                <a:gd name="connsiteX10" fmla="*/ 2381 w 1445418"/>
+                <a:gd name="connsiteY10" fmla="*/ 0 h 2095500"/>
+                <a:gd name="connsiteX0" fmla="*/ 2381 w 1445418"/>
+                <a:gd name="connsiteY0" fmla="*/ 0 h 2095500"/>
+                <a:gd name="connsiteX1" fmla="*/ 0 w 1445418"/>
+                <a:gd name="connsiteY1" fmla="*/ 338137 h 2095500"/>
+                <a:gd name="connsiteX2" fmla="*/ 159543 w 1445418"/>
+                <a:gd name="connsiteY2" fmla="*/ 492918 h 2095500"/>
+                <a:gd name="connsiteX3" fmla="*/ 7143 w 1445418"/>
+                <a:gd name="connsiteY3" fmla="*/ 657224 h 2095500"/>
+                <a:gd name="connsiteX4" fmla="*/ 7143 w 1445418"/>
+                <a:gd name="connsiteY4" fmla="*/ 2095500 h 2095500"/>
+                <a:gd name="connsiteX5" fmla="*/ 1445418 w 1445418"/>
+                <a:gd name="connsiteY5" fmla="*/ 2095500 h 2095500"/>
+                <a:gd name="connsiteX6" fmla="*/ 1445418 w 1445418"/>
+                <a:gd name="connsiteY6" fmla="*/ 652462 h 2095500"/>
+                <a:gd name="connsiteX7" fmla="*/ 1288256 w 1445418"/>
+                <a:gd name="connsiteY7" fmla="*/ 495300 h 2095500"/>
+                <a:gd name="connsiteX8" fmla="*/ 1445418 w 1445418"/>
+                <a:gd name="connsiteY8" fmla="*/ 338138 h 2095500"/>
+                <a:gd name="connsiteX9" fmla="*/ 1445418 w 1445418"/>
+                <a:gd name="connsiteY9" fmla="*/ 9525 h 2095500"/>
+                <a:gd name="connsiteX10" fmla="*/ 2381 w 1445418"/>
+                <a:gd name="connsiteY10" fmla="*/ 0 h 2095500"/>
+              </a:gdLst>
+              <a:ahLst/>
+              <a:cxnLst>
+                <a:cxn ang="0">
+                  <a:pos x="connsiteX0" y="connsiteY0"/>
+                </a:cxn>
+                <a:cxn ang="0">
+                  <a:pos x="connsiteX1" y="connsiteY1"/>
+                </a:cxn>
+                <a:cxn ang="0">
+                  <a:pos x="connsiteX2" y="connsiteY2"/>
+                </a:cxn>
+                <a:cxn ang="0">
+                  <a:pos x="connsiteX3" y="connsiteY3"/>
+                </a:cxn>
+                <a:cxn ang="0">
+                  <a:pos x="connsiteX4" y="connsiteY4"/>
+                </a:cxn>
+                <a:cxn ang="0">
+                  <a:pos x="connsiteX5" y="connsiteY5"/>
+                </a:cxn>
+                <a:cxn ang="0">
+                  <a:pos x="connsiteX6" y="connsiteY6"/>
+                </a:cxn>
+                <a:cxn ang="0">
+                  <a:pos x="connsiteX7" y="connsiteY7"/>
+                </a:cxn>
+                <a:cxn ang="0">
+                  <a:pos x="connsiteX8" y="connsiteY8"/>
+                </a:cxn>
+                <a:cxn ang="0">
+                  <a:pos x="connsiteX9" y="connsiteY9"/>
+                </a:cxn>
+                <a:cxn ang="0">
+                  <a:pos x="connsiteX10" y="connsiteY10"/>
+                </a:cxn>
+              </a:cxnLst>
+              <a:rect l="l" t="t" r="r" b="b"/>
+              <a:pathLst>
+                <a:path w="1445418" h="2095500">
+                  <a:moveTo>
+                    <a:pt x="2381" y="0"/>
+                  </a:moveTo>
+                  <a:cubicBezTo>
+                    <a:pt x="1587" y="112712"/>
+                    <a:pt x="794" y="225425"/>
+                    <a:pt x="0" y="338137"/>
+                  </a:cubicBezTo>
+                  <a:lnTo>
+                    <a:pt x="159543" y="492918"/>
+                  </a:lnTo>
+                  <a:lnTo>
+                    <a:pt x="7143" y="657224"/>
+                  </a:lnTo>
+                  <a:lnTo>
+                    <a:pt x="7143" y="2095500"/>
+                  </a:lnTo>
+                  <a:lnTo>
+                    <a:pt x="1445418" y="2095500"/>
+                  </a:lnTo>
+                  <a:lnTo>
+                    <a:pt x="1445418" y="652462"/>
+                  </a:lnTo>
+                  <a:lnTo>
+                    <a:pt x="1288256" y="495300"/>
+                  </a:lnTo>
+                  <a:lnTo>
+                    <a:pt x="1445418" y="338138"/>
+                  </a:lnTo>
+                  <a:lnTo>
+                    <a:pt x="1445418" y="9525"/>
+                  </a:lnTo>
+                  <a:lnTo>
+                    <a:pt x="2381" y="0"/>
+                  </a:lnTo>
+                  <a:close/>
+                </a:path>
+              </a:pathLst>
+            </a:custGeom>
+            <a:solidFill>
+              <a:schemeClr val="bg1">
+                <a:lumMod val="95000"/>
+              </a:schemeClr>
+            </a:solidFill>
+            <a:ln>
+              <a:solidFill>
+                <a:schemeClr val="tx1"/>
+              </a:solidFill>
+            </a:ln>
+          </p:spPr>
+          <p:style>
+            <a:lnRef idx="2">
+              <a:schemeClr val="accent1">
+                <a:shade val="50000"/>
+              </a:schemeClr>
+            </a:lnRef>
+            <a:fillRef idx="1">
+              <a:schemeClr val="accent1"/>
+            </a:fillRef>
+            <a:effectRef idx="0">
+              <a:schemeClr val="accent1"/>
+            </a:effectRef>
+            <a:fontRef idx="minor">
+              <a:schemeClr val="lt1"/>
+            </a:fontRef>
+          </p:style>
+          <p:txBody>
+            <a:bodyPr rtlCol="0" anchor="ctr"/>
+            <a:lstStyle/>
+            <a:p>
+              <a:pPr algn="ctr"/>
+              <a:endParaRPr lang="en-NZ"/>
+            </a:p>
+          </p:txBody>
+        </p:sp>
+      </p:grpSp>
+    </p:spTree>
+    <p:extLst>
+      <p:ext uri="{BB962C8B-B14F-4D97-AF65-F5344CB8AC3E}">
+        <p14:creationId xmlns:p14="http://schemas.microsoft.com/office/powerpoint/2010/main" val="934755486"/>
+      </p:ext>
+    </p:extLst>
+  </p:cSld>
+  <p:clrMapOvr>
+    <a:masterClrMapping/>
+  </p:clrMapOvr>
+</p:sld>
+</file>
+
 <file path=ppt/theme/theme1.xml><?xml version="1.0" encoding="utf-8"?>
 <a:theme xmlns:a="http://schemas.openxmlformats.org/drawingml/2006/main" name="Office Theme">
   <a:themeElements>

</xml_diff>